<commit_message>
Maj doc + diapo étudiant 1
</commit_message>
<xml_diff>
--- a/Guillaume/Documents/Revue 1 de projet étudiant 1 Escape Game Téléthon.pptx
+++ b/Guillaume/Documents/Revue 1 de projet étudiant 1 Escape Game Téléthon.pptx
@@ -8566,8 +8566,8 @@
         </p:nvCxnSpPr>
         <p:spPr>
           <a:xfrm flipH="1">
-            <a:off x="3294185" y="4384431"/>
-            <a:ext cx="542020" cy="879231"/>
+            <a:off x="3392424" y="4384431"/>
+            <a:ext cx="443781" cy="786597"/>
           </a:xfrm>
           <a:prstGeom prst="straightConnector1">
             <a:avLst/>
@@ -9419,6 +9419,98 @@
           <a:p>
             <a:pPr algn="ctr"/>
             <a:endParaRPr lang="fr-FR"/>
+          </a:p>
+        </p:txBody>
+      </p:sp>
+      <p:sp>
+        <p:nvSpPr>
+          <p:cNvPr id="3" name="Rectangle 2">
+            <a:extLst>
+              <a:ext uri="{FF2B5EF4-FFF2-40B4-BE49-F238E27FC236}">
+                <a16:creationId xmlns:a16="http://schemas.microsoft.com/office/drawing/2014/main" id="{828AF603-9628-4F8C-9562-EAD5B3128255}"/>
+              </a:ext>
+            </a:extLst>
+          </p:cNvPr>
+          <p:cNvSpPr/>
+          <p:nvPr/>
+        </p:nvSpPr>
+        <p:spPr>
+          <a:xfrm>
+            <a:off x="2340864" y="5185912"/>
+            <a:ext cx="1462059" cy="1050296"/>
+          </a:xfrm>
+          <a:prstGeom prst="rect">
+            <a:avLst/>
+          </a:prstGeom>
+          <a:noFill/>
+          <a:ln w="38100">
+            <a:solidFill>
+              <a:srgbClr val="A51258"/>
+            </a:solidFill>
+          </a:ln>
+        </p:spPr>
+        <p:style>
+          <a:lnRef idx="2">
+            <a:schemeClr val="accent1">
+              <a:shade val="50000"/>
+            </a:schemeClr>
+          </a:lnRef>
+          <a:fillRef idx="1">
+            <a:schemeClr val="accent1"/>
+          </a:fillRef>
+          <a:effectRef idx="0">
+            <a:schemeClr val="accent1"/>
+          </a:effectRef>
+          <a:fontRef idx="minor">
+            <a:schemeClr val="lt1"/>
+          </a:fontRef>
+        </p:style>
+        <p:txBody>
+          <a:bodyPr rtlCol="0" anchor="ctr"/>
+          <a:lstStyle/>
+          <a:p>
+            <a:pPr algn="ctr"/>
+            <a:endParaRPr lang="fr-FR"/>
+          </a:p>
+        </p:txBody>
+      </p:sp>
+      <p:sp>
+        <p:nvSpPr>
+          <p:cNvPr id="27" name="ZoneTexte 26">
+            <a:extLst>
+              <a:ext uri="{FF2B5EF4-FFF2-40B4-BE49-F238E27FC236}">
+                <a16:creationId xmlns:a16="http://schemas.microsoft.com/office/drawing/2014/main" id="{C4A860E1-2CEA-4F2D-B219-2475CC72715B}"/>
+              </a:ext>
+            </a:extLst>
+          </p:cNvPr>
+          <p:cNvSpPr txBox="1"/>
+          <p:nvPr/>
+        </p:nvSpPr>
+        <p:spPr>
+          <a:xfrm>
+            <a:off x="3757657" y="5482368"/>
+            <a:ext cx="3859323" cy="369332"/>
+          </a:xfrm>
+          <a:prstGeom prst="rect">
+            <a:avLst/>
+          </a:prstGeom>
+          <a:noFill/>
+        </p:spPr>
+        <p:txBody>
+          <a:bodyPr wrap="square" rtlCol="0">
+            <a:spAutoFit/>
+          </a:bodyPr>
+          <a:lstStyle/>
+          <a:p>
+            <a:r>
+              <a:rPr lang="fr-FR" dirty="0">
+                <a:solidFill>
+                  <a:srgbClr val="A31257"/>
+                </a:solidFill>
+                <a:latin typeface="Eras Medium ITC" panose="020B0602030504020804" pitchFamily="34" charset="0"/>
+              </a:rPr>
+              <a:t>Détecter l’ordre de fin de partie </a:t>
+            </a:r>
           </a:p>
         </p:txBody>
       </p:sp>
@@ -10932,8 +11024,8 @@
         </p:nvSpPr>
         <p:spPr>
           <a:xfrm>
-            <a:off x="4801617" y="2140848"/>
-            <a:ext cx="3799332" cy="2862322"/>
+            <a:off x="4867669" y="1549400"/>
+            <a:ext cx="3799332" cy="3416320"/>
           </a:xfrm>
           <a:prstGeom prst="rect">
             <a:avLst/>
@@ -11003,6 +11095,18 @@
                 <a:latin typeface="Eras Medium ITC" panose="020B0602030504020804" pitchFamily="34" charset="0"/>
               </a:rPr>
               <a:t>Si 4 UID corrects, envoyer l’ordre de fin partie à l’application de supervision.</a:t>
+            </a:r>
+          </a:p>
+          <a:p>
+            <a:pPr marL="285750" indent="-285750">
+              <a:buFont typeface="Arial" panose="020B0604020202020204" pitchFamily="34" charset="0"/>
+              <a:buChar char="•"/>
+            </a:pPr>
+            <a:r>
+              <a:rPr lang="fr-FR" dirty="0">
+                <a:latin typeface="Eras Medium ITC" panose="020B0602030504020804" pitchFamily="34" charset="0"/>
+              </a:rPr>
+              <a:t>Détecté l’ordre de fin de partie dans l’application de supervision.</a:t>
             </a:r>
           </a:p>
         </p:txBody>

</xml_diff>